<commit_message>
Adds the Commiting a Change slide
Slide I made to show the process of committing a change
</commit_message>
<xml_diff>
--- a/Github.pptx
+++ b/Github.pptx
@@ -5,10 +5,10 @@
     <p:sldMasterId id="2147483648" r:id="rId2"/>
   </p:sldMasterIdLst>
   <p:notesMasterIdLst>
-    <p:notesMasterId r:id="rId17"/>
+    <p:notesMasterId r:id="rId18"/>
   </p:notesMasterIdLst>
   <p:handoutMasterIdLst>
-    <p:handoutMasterId r:id="rId18"/>
+    <p:handoutMasterId r:id="rId19"/>
   </p:handoutMasterIdLst>
   <p:sldIdLst>
     <p:sldId id="261" r:id="rId3"/>
@@ -23,8 +23,9 @@
     <p:sldId id="267" r:id="rId12"/>
     <p:sldId id="277" r:id="rId13"/>
     <p:sldId id="268" r:id="rId14"/>
-    <p:sldId id="269" r:id="rId15"/>
-    <p:sldId id="270" r:id="rId16"/>
+    <p:sldId id="278" r:id="rId15"/>
+    <p:sldId id="279" r:id="rId16"/>
+    <p:sldId id="280" r:id="rId17"/>
   </p:sldIdLst>
   <p:sldSz cx="12192000" cy="6858000"/>
   <p:notesSz cx="6858000" cy="9144000"/>
@@ -15212,7 +15213,18 @@
             <a:pPr lvl="1"/>
             <a:r>
               <a:rPr lang="en-US" dirty="0" smtClean="0"/>
-              <a:t>Online: Click user icon in top right &gt; your profile &gt; repository tab</a:t>
+              <a:t>Online: Click user icon in top right &gt; your profile &gt; repository </a:t>
+            </a:r>
+            <a:r>
+              <a:rPr lang="en-US" dirty="0" smtClean="0"/>
+              <a:t>tab &gt; new</a:t>
+            </a:r>
+          </a:p>
+          <a:p>
+            <a:pPr lvl="1"/>
+            <a:r>
+              <a:rPr lang="en-US" dirty="0" smtClean="0"/>
+              <a:t>Desktop: Drag an existing folder into the repository sidebar</a:t>
             </a:r>
             <a:endParaRPr lang="en-US" dirty="0"/>
           </a:p>
@@ -15283,10 +15295,10 @@
           <a:lstStyle/>
           <a:p>
             <a:r>
-              <a:rPr lang="en-US" smtClean="0"/>
-              <a:t>slllAAAAMMMin</a:t>
+              <a:rPr lang="en-US" dirty="0" smtClean="0"/>
+              <a:t>Adding Users to a Repository</a:t>
             </a:r>
-            <a:endParaRPr lang="en-US"/>
+            <a:endParaRPr lang="en-US" dirty="0"/>
           </a:p>
         </p:txBody>
       </p:sp>
@@ -15305,7 +15317,28 @@
           <a:bodyPr/>
           <a:lstStyle/>
           <a:p>
-            <a:endParaRPr lang="en-US"/>
+            <a:r>
+              <a:rPr lang="en-US" dirty="0" smtClean="0"/>
+              <a:t>On </a:t>
+            </a:r>
+            <a:r>
+              <a:rPr lang="en-US" dirty="0" smtClean="0">
+                <a:hlinkClick r:id="rId2"/>
+              </a:rPr>
+              <a:t>https://github.com</a:t>
+            </a:r>
+            <a:r>
+              <a:rPr lang="en-US" dirty="0" smtClean="0"/>
+              <a:t> log in and view your repository.</a:t>
+            </a:r>
+          </a:p>
+          <a:p>
+            <a:pPr lvl="1"/>
+            <a:r>
+              <a:rPr lang="en-US" dirty="0" smtClean="0"/>
+              <a:t>Navigate to settings &gt; collaborators, then type in the user address and incite</a:t>
+            </a:r>
+            <a:endParaRPr lang="en-US" dirty="0"/>
           </a:p>
         </p:txBody>
       </p:sp>
@@ -15351,6 +15384,133 @@
           <a:chExt cx="0" cy="0"/>
         </a:xfrm>
       </p:grpSpPr>
+      <p:sp>
+        <p:nvSpPr>
+          <p:cNvPr id="2" name="Title 1"/>
+          <p:cNvSpPr>
+            <a:spLocks noGrp="1"/>
+          </p:cNvSpPr>
+          <p:nvPr>
+            <p:ph type="title"/>
+          </p:nvPr>
+        </p:nvSpPr>
+        <p:spPr/>
+        <p:txBody>
+          <a:bodyPr/>
+          <a:lstStyle/>
+          <a:p>
+            <a:r>
+              <a:rPr lang="en-US" dirty="0" smtClean="0"/>
+              <a:t>Creating a Branch</a:t>
+            </a:r>
+            <a:endParaRPr lang="en-US" dirty="0"/>
+          </a:p>
+        </p:txBody>
+      </p:sp>
+      <p:sp>
+        <p:nvSpPr>
+          <p:cNvPr id="3" name="Content Placeholder 2"/>
+          <p:cNvSpPr>
+            <a:spLocks noGrp="1"/>
+          </p:cNvSpPr>
+          <p:nvPr>
+            <p:ph idx="1"/>
+          </p:nvPr>
+        </p:nvSpPr>
+        <p:spPr>
+          <a:xfrm>
+            <a:off x="1295400" y="1988345"/>
+            <a:ext cx="9601200" cy="3809999"/>
+          </a:xfrm>
+        </p:spPr>
+        <p:txBody>
+          <a:bodyPr/>
+          <a:lstStyle/>
+          <a:p>
+            <a:r>
+              <a:rPr lang="en-US" dirty="0" smtClean="0"/>
+              <a:t>In GitHub desktop click the branch button to the right of the repository toolbar </a:t>
+            </a:r>
+            <a:endParaRPr lang="en-US" dirty="0"/>
+          </a:p>
+        </p:txBody>
+      </p:sp>
+      <p:pic>
+        <p:nvPicPr>
+          <p:cNvPr id="4" name="Picture 3"/>
+          <p:cNvPicPr>
+            <a:picLocks noChangeAspect="1"/>
+          </p:cNvPicPr>
+          <p:nvPr/>
+        </p:nvPicPr>
+        <p:blipFill>
+          <a:blip r:embed="rId2">
+            <a:extLst>
+              <a:ext uri="{28A0092B-C50C-407E-A947-70E740481C1C}">
+                <a14:useLocalDpi xmlns:a14="http://schemas.microsoft.com/office/drawing/2010/main" val="0"/>
+              </a:ext>
+            </a:extLst>
+          </a:blip>
+          <a:stretch>
+            <a:fillRect/>
+          </a:stretch>
+        </p:blipFill>
+        <p:spPr>
+          <a:xfrm>
+            <a:off x="2050085" y="2980473"/>
+            <a:ext cx="6648792" cy="2254366"/>
+          </a:xfrm>
+          <a:prstGeom prst="rect">
+            <a:avLst/>
+          </a:prstGeom>
+        </p:spPr>
+      </p:pic>
+      <p:sp>
+        <p:nvSpPr>
+          <p:cNvPr id="5" name="Rectangle 4"/>
+          <p:cNvSpPr/>
+          <p:nvPr/>
+        </p:nvSpPr>
+        <p:spPr>
+          <a:xfrm>
+            <a:off x="4214813" y="3324882"/>
+            <a:ext cx="392906" cy="336331"/>
+          </a:xfrm>
+          <a:prstGeom prst="rect">
+            <a:avLst/>
+          </a:prstGeom>
+          <a:noFill/>
+          <a:ln w="57150">
+            <a:solidFill>
+              <a:srgbClr val="FF0000"/>
+            </a:solidFill>
+          </a:ln>
+        </p:spPr>
+        <p:style>
+          <a:lnRef idx="2">
+            <a:schemeClr val="accent1">
+              <a:shade val="50000"/>
+            </a:schemeClr>
+          </a:lnRef>
+          <a:fillRef idx="1">
+            <a:schemeClr val="accent1"/>
+          </a:fillRef>
+          <a:effectRef idx="0">
+            <a:schemeClr val="accent1"/>
+          </a:effectRef>
+          <a:fontRef idx="minor">
+            <a:schemeClr val="lt1"/>
+          </a:fontRef>
+        </p:style>
+        <p:txBody>
+          <a:bodyPr rtlCol="0" anchor="ctr"/>
+          <a:lstStyle/>
+          <a:p>
+            <a:pPr algn="ctr"/>
+            <a:endParaRPr lang="en-US"/>
+          </a:p>
+        </p:txBody>
+      </p:sp>
     </p:spTree>
     <p:extLst>
       <p:ext uri="{BB962C8B-B14F-4D97-AF65-F5344CB8AC3E}">
@@ -15415,7 +15575,11 @@
           <a:bodyPr/>
           <a:lstStyle/>
           <a:p>
-            <a:endParaRPr lang="en-US"/>
+            <a:r>
+              <a:rPr lang="en-US" dirty="0" smtClean="0"/>
+              <a:t>Committing a change</a:t>
+            </a:r>
+            <a:endParaRPr lang="en-US" dirty="0"/>
           </a:p>
         </p:txBody>
       </p:sp>
@@ -15434,33 +15598,46 @@
           <a:bodyPr/>
           <a:lstStyle/>
           <a:p>
-            <a:endParaRPr lang="en-US"/>
+            <a:r>
+              <a:rPr lang="en-US" dirty="0" smtClean="0"/>
+              <a:t>Only logs the changes you have made, a commit does not make these changes viewable to anyone.</a:t>
+            </a:r>
           </a:p>
-        </p:txBody>
-      </p:sp>
-      <p:sp>
-        <p:nvSpPr>
-          <p:cNvPr id="4" name="Text Placeholder 3"/>
-          <p:cNvSpPr>
-            <a:spLocks noGrp="1"/>
-          </p:cNvSpPr>
-          <p:nvPr>
-            <p:ph type="body" sz="half" idx="2"/>
-          </p:nvPr>
-        </p:nvSpPr>
-        <p:spPr/>
-        <p:txBody>
-          <a:bodyPr/>
-          <a:lstStyle/>
           <a:p>
-            <a:endParaRPr lang="en-US"/>
+            <a:r>
+              <a:rPr lang="en-US" dirty="0" smtClean="0"/>
+              <a:t>Toggle views form History to Changes</a:t>
+            </a:r>
+          </a:p>
+          <a:p>
+            <a:r>
+              <a:rPr lang="en-US" dirty="0" smtClean="0"/>
+              <a:t>Write a summary statement</a:t>
+            </a:r>
+          </a:p>
+          <a:p>
+            <a:pPr lvl="1"/>
+            <a:r>
+              <a:rPr lang="en-US" dirty="0" smtClean="0"/>
+              <a:t>A proper summary statement will finish this sentence: </a:t>
+            </a:r>
+            <a:r>
+              <a:rPr lang="en-US" i="1" dirty="0" smtClean="0"/>
+              <a:t>“When applied, this change will…”</a:t>
+            </a:r>
+          </a:p>
+          <a:p>
+            <a:r>
+              <a:rPr lang="en-US" dirty="0" smtClean="0"/>
+              <a:t>Commit to master</a:t>
+            </a:r>
           </a:p>
         </p:txBody>
       </p:sp>
     </p:spTree>
     <p:extLst>
       <p:ext uri="{BB962C8B-B14F-4D97-AF65-F5344CB8AC3E}">
-        <p14:creationId xmlns:p14="http://schemas.microsoft.com/office/powerpoint/2010/main" val="4101607575"/>
+        <p14:creationId xmlns:p14="http://schemas.microsoft.com/office/powerpoint/2010/main" val="4138474169"/>
       </p:ext>
     </p:extLst>
   </p:cSld>
@@ -15479,13 +15656,6 @@
       </p:transition>
     </mc:Fallback>
   </mc:AlternateContent>
-  <p:timing>
-    <p:tnLst>
-      <p:par>
-        <p:cTn id="1" dur="indefinite" restart="never" nodeType="tmRoot"/>
-      </p:par>
-    </p:tnLst>
-  </p:timing>
 </p:sld>
 </file>
 
@@ -15506,21 +15676,173 @@
           <a:chExt cx="0" cy="0"/>
         </a:xfrm>
       </p:grpSpPr>
+      <p:pic>
+        <p:nvPicPr>
+          <p:cNvPr id="4" name="Picture 3"/>
+          <p:cNvPicPr>
+            <a:picLocks noChangeAspect="1"/>
+          </p:cNvPicPr>
+          <p:nvPr/>
+        </p:nvPicPr>
+        <p:blipFill>
+          <a:blip r:embed="rId2">
+            <a:extLst>
+              <a:ext uri="{28A0092B-C50C-407E-A947-70E740481C1C}">
+                <a14:useLocalDpi xmlns:a14="http://schemas.microsoft.com/office/drawing/2010/main" val="0"/>
+              </a:ext>
+            </a:extLst>
+          </a:blip>
+          <a:stretch>
+            <a:fillRect/>
+          </a:stretch>
+        </p:blipFill>
+        <p:spPr>
+          <a:xfrm>
+            <a:off x="0" y="0"/>
+            <a:ext cx="12207830" cy="6680006"/>
+          </a:xfrm>
+          <a:prstGeom prst="rect">
+            <a:avLst/>
+          </a:prstGeom>
+        </p:spPr>
+      </p:pic>
       <p:sp>
         <p:nvSpPr>
-          <p:cNvPr id="2" name="Picture Placeholder 1"/>
-          <p:cNvSpPr>
-            <a:spLocks noGrp="1"/>
-          </p:cNvSpPr>
-          <p:nvPr>
-            <p:ph type="pic" idx="1"/>
-          </p:nvPr>
+          <p:cNvPr id="6" name="Rectangle 5"/>
+          <p:cNvSpPr/>
+          <p:nvPr/>
         </p:nvSpPr>
-        <p:spPr/>
+        <p:spPr>
+          <a:xfrm>
+            <a:off x="6233276" y="147386"/>
+            <a:ext cx="1856722" cy="418006"/>
+          </a:xfrm>
+          <a:prstGeom prst="rect">
+            <a:avLst/>
+          </a:prstGeom>
+          <a:noFill/>
+          <a:ln w="57150">
+            <a:solidFill>
+              <a:srgbClr val="FF0000"/>
+            </a:solidFill>
+          </a:ln>
+        </p:spPr>
+        <p:style>
+          <a:lnRef idx="2">
+            <a:schemeClr val="accent1">
+              <a:shade val="50000"/>
+            </a:schemeClr>
+          </a:lnRef>
+          <a:fillRef idx="1">
+            <a:schemeClr val="accent1"/>
+          </a:fillRef>
+          <a:effectRef idx="0">
+            <a:schemeClr val="accent1"/>
+          </a:effectRef>
+          <a:fontRef idx="minor">
+            <a:schemeClr val="lt1"/>
+          </a:fontRef>
+        </p:style>
+        <p:txBody>
+          <a:bodyPr rtlCol="0" anchor="ctr"/>
+          <a:lstStyle/>
+          <a:p>
+            <a:pPr algn="ctr"/>
+            <a:endParaRPr lang="en-US"/>
+          </a:p>
+        </p:txBody>
       </p:sp>
       <p:sp>
         <p:nvSpPr>
-          <p:cNvPr id="3" name="Title 2"/>
+          <p:cNvPr id="7" name="Rectangle 6"/>
+          <p:cNvSpPr/>
+          <p:nvPr/>
+        </p:nvSpPr>
+        <p:spPr>
+          <a:xfrm>
+            <a:off x="2853719" y="6191035"/>
+            <a:ext cx="1856722" cy="418006"/>
+          </a:xfrm>
+          <a:prstGeom prst="rect">
+            <a:avLst/>
+          </a:prstGeom>
+          <a:noFill/>
+          <a:ln w="57150">
+            <a:solidFill>
+              <a:srgbClr val="FF0000"/>
+            </a:solidFill>
+          </a:ln>
+        </p:spPr>
+        <p:style>
+          <a:lnRef idx="2">
+            <a:schemeClr val="accent1">
+              <a:shade val="50000"/>
+            </a:schemeClr>
+          </a:lnRef>
+          <a:fillRef idx="1">
+            <a:schemeClr val="accent1"/>
+          </a:fillRef>
+          <a:effectRef idx="0">
+            <a:schemeClr val="accent1"/>
+          </a:effectRef>
+          <a:fontRef idx="minor">
+            <a:schemeClr val="lt1"/>
+          </a:fontRef>
+        </p:style>
+        <p:txBody>
+          <a:bodyPr rtlCol="0" anchor="ctr"/>
+          <a:lstStyle/>
+          <a:p>
+            <a:pPr algn="ctr"/>
+            <a:endParaRPr lang="en-US"/>
+          </a:p>
+        </p:txBody>
+      </p:sp>
+    </p:spTree>
+    <p:extLst>
+      <p:ext uri="{BB962C8B-B14F-4D97-AF65-F5344CB8AC3E}">
+        <p14:creationId xmlns:p14="http://schemas.microsoft.com/office/powerpoint/2010/main" val="1195369856"/>
+      </p:ext>
+    </p:extLst>
+  </p:cSld>
+  <p:clrMapOvr>
+    <a:masterClrMapping/>
+  </p:clrMapOvr>
+  <mc:AlternateContent xmlns:mc="http://schemas.openxmlformats.org/markup-compatibility/2006" xmlns:p14="http://schemas.microsoft.com/office/powerpoint/2010/main">
+    <mc:Choice Requires="p14">
+      <p:transition spd="med" p14:dur="700">
+        <p:fade/>
+      </p:transition>
+    </mc:Choice>
+    <mc:Fallback xmlns="">
+      <p:transition spd="med">
+        <p:fade/>
+      </p:transition>
+    </mc:Fallback>
+  </mc:AlternateContent>
+</p:sld>
+</file>
+
+<file path=ppt/slides/slide15.xml><?xml version="1.0" encoding="utf-8"?>
+<p:sld xmlns:a="http://schemas.openxmlformats.org/drawingml/2006/main" xmlns:r="http://schemas.openxmlformats.org/officeDocument/2006/relationships" xmlns:p="http://schemas.openxmlformats.org/presentationml/2006/main">
+  <p:cSld>
+    <p:spTree>
+      <p:nvGrpSpPr>
+        <p:cNvPr id="1" name=""/>
+        <p:cNvGrpSpPr/>
+        <p:nvPr/>
+      </p:nvGrpSpPr>
+      <p:grpSpPr>
+        <a:xfrm>
+          <a:off x="0" y="0"/>
+          <a:ext cx="0" cy="0"/>
+          <a:chOff x="0" y="0"/>
+          <a:chExt cx="0" cy="0"/>
+        </a:xfrm>
+      </p:grpSpPr>
+      <p:sp>
+        <p:nvSpPr>
+          <p:cNvPr id="2" name="Title 1"/>
           <p:cNvSpPr>
             <a:spLocks noGrp="1"/>
           </p:cNvSpPr>
@@ -15533,18 +15855,22 @@
           <a:bodyPr/>
           <a:lstStyle/>
           <a:p>
-            <a:endParaRPr lang="en-US"/>
+            <a:r>
+              <a:rPr lang="en-US" dirty="0" smtClean="0"/>
+              <a:t>Submitting a Pull Request</a:t>
+            </a:r>
+            <a:endParaRPr lang="en-US" dirty="0"/>
           </a:p>
         </p:txBody>
       </p:sp>
       <p:sp>
         <p:nvSpPr>
-          <p:cNvPr id="4" name="Text Placeholder 3"/>
+          <p:cNvPr id="3" name="Content Placeholder 2"/>
           <p:cNvSpPr>
             <a:spLocks noGrp="1"/>
           </p:cNvSpPr>
           <p:nvPr>
-            <p:ph type="body" sz="half" idx="2"/>
+            <p:ph idx="1"/>
           </p:nvPr>
         </p:nvSpPr>
         <p:spPr/>
@@ -15552,14 +15878,28 @@
           <a:bodyPr/>
           <a:lstStyle/>
           <a:p>
-            <a:endParaRPr lang="en-US"/>
+            <a:r>
+              <a:rPr lang="en-US" dirty="0" smtClean="0"/>
+              <a:t>A pull request is a request to merge your changes to a branch</a:t>
+            </a:r>
+          </a:p>
+          <a:p>
+            <a:r>
+              <a:rPr lang="en-US" dirty="0" smtClean="0"/>
+              <a:t>Up until your pull request is accepted, all changes to the program are </a:t>
+            </a:r>
+            <a:r>
+              <a:rPr lang="en-US" smtClean="0"/>
+              <a:t>exclusively local</a:t>
+            </a:r>
+            <a:endParaRPr lang="en-US" dirty="0"/>
           </a:p>
         </p:txBody>
       </p:sp>
     </p:spTree>
     <p:extLst>
       <p:ext uri="{BB962C8B-B14F-4D97-AF65-F5344CB8AC3E}">
-        <p14:creationId xmlns:p14="http://schemas.microsoft.com/office/powerpoint/2010/main" val="2794409471"/>
+        <p14:creationId xmlns:p14="http://schemas.microsoft.com/office/powerpoint/2010/main" val="269012034"/>
       </p:ext>
     </p:extLst>
   </p:cSld>
@@ -15778,11 +16118,11 @@
           <a:p>
             <a:r>
               <a:rPr lang="en-US" dirty="0" smtClean="0"/>
-              <a:t>GitHub is a version control platform for collaborative </a:t>
+              <a:t>GitHub is </a:t>
             </a:r>
             <a:r>
               <a:rPr lang="en-US" dirty="0" smtClean="0"/>
-              <a:t>development</a:t>
+              <a:t>a repository hosting service that manages and controls project revisions</a:t>
             </a:r>
             <a:endParaRPr lang="en-US" dirty="0"/>
           </a:p>
@@ -15883,13 +16223,19 @@
           <a:p>
             <a:r>
               <a:rPr lang="en-US" dirty="0" smtClean="0"/>
-              <a:t>Share all project folders via cloud storage</a:t>
+              <a:t>Share </a:t>
             </a:r>
-          </a:p>
-          <a:p>
             <a:r>
               <a:rPr lang="en-US" dirty="0" smtClean="0"/>
-              <a:t>Keep a detailed record of every change made and give us the ability to revert back on those changes</a:t>
+              <a:t>project </a:t>
+            </a:r>
+            <a:r>
+              <a:rPr lang="en-US" dirty="0" smtClean="0"/>
+              <a:t>folders via cloud </a:t>
+            </a:r>
+            <a:r>
+              <a:rPr lang="en-US" dirty="0" smtClean="0"/>
+              <a:t>storage</a:t>
             </a:r>
           </a:p>
           <a:p>
@@ -15982,7 +16328,7 @@
         <p:spPr/>
         <p:txBody>
           <a:bodyPr>
-            <a:normAutofit fontScale="85000" lnSpcReduction="20000"/>
+            <a:normAutofit fontScale="85000" lnSpcReduction="10000"/>
           </a:bodyPr>
           <a:lstStyle/>
           <a:p>
@@ -16017,12 +16363,8 @@
               <a:t> of the main repo corresponds to a contributor's work. A fork is really a </a:t>
             </a:r>
             <a:r>
-              <a:rPr lang="en-US" dirty="0" err="1" smtClean="0"/>
-              <a:t>Github</a:t>
-            </a:r>
-            <a:r>
               <a:rPr lang="en-US" dirty="0" smtClean="0"/>
-              <a:t> </a:t>
+              <a:t>GitHub </a:t>
             </a:r>
             <a:r>
               <a:rPr lang="en-US" dirty="0"/>
@@ -16058,18 +16400,26 @@
             </a:r>
             <a:r>
               <a:rPr lang="en-US" b="1" dirty="0"/>
-              <a:t>pull request</a:t>
+              <a:t>pull </a:t>
+            </a:r>
+            <a:r>
+              <a:rPr lang="en-US" b="1" dirty="0" smtClean="0"/>
+              <a:t>request</a:t>
+            </a:r>
+            <a:r>
+              <a:rPr lang="en-US" dirty="0" smtClean="0"/>
+              <a:t> </a:t>
             </a:r>
             <a:r>
               <a:rPr lang="en-US" dirty="0"/>
-              <a:t> (in the GitHub ecosystem) corresponds to the task. Every time I want to contribute an isolated finished task to the main repo, I create a pull request corresponding to </a:t>
+              <a:t>corresponds to the task. Every time I want to contribute an isolated finished task to the main repo, I create a pull request corresponding to </a:t>
             </a:r>
             <a:r>
-              <a:rPr lang="en-US" dirty="0" err="1"/>
-              <a:t>the</a:t>
+              <a:rPr lang="en-US" dirty="0" smtClean="0"/>
+              <a:t>the </a:t>
             </a:r>
             <a:r>
-              <a:rPr lang="en-US" b="1" dirty="0" err="1"/>
+              <a:rPr lang="en-US" b="1" dirty="0" smtClean="0"/>
               <a:t>commits</a:t>
             </a:r>
             <a:r>
@@ -16093,16 +16443,16 @@
               <a:t> to </a:t>
             </a:r>
             <a:r>
-              <a:rPr lang="en-US" dirty="0" err="1"/>
-              <a:t>the</a:t>
+              <a:rPr lang="en-US" dirty="0" smtClean="0"/>
+              <a:t>the </a:t>
             </a:r>
             <a:r>
-              <a:rPr lang="en-US" b="1" dirty="0" err="1"/>
-              <a:t>main</a:t>
+              <a:rPr lang="en-US" b="1" dirty="0" smtClean="0"/>
+              <a:t>main </a:t>
             </a:r>
             <a:r>
               <a:rPr lang="en-US" b="1" dirty="0"/>
-              <a:t> repo</a:t>
+              <a:t>repo</a:t>
             </a:r>
             <a:r>
               <a:rPr lang="en-US" dirty="0"/>

</xml_diff>